<commit_message>
repo links added to final report and presentation
</commit_message>
<xml_diff>
--- a/CTF-Project.pptx
+++ b/CTF-Project.pptx
@@ -326,7 +326,7 @@
           <a:p>
             <a:fld id="{D54CC0BB-093E-46C4-B018-947CFFB692B4}" type="datetimeFigureOut">
               <a:rPr lang="en-US" smtClean="0"/>
-              <a:t>24-Jul-17</a:t>
+              <a:t>7/24/2017</a:t>
             </a:fld>
             <a:endParaRPr lang="en-US"/>
           </a:p>
@@ -491,7 +491,7 @@
           <a:p>
             <a:fld id="{D54CC0BB-093E-46C4-B018-947CFFB692B4}" type="datetimeFigureOut">
               <a:rPr lang="en-US" smtClean="0"/>
-              <a:t>24-Jul-17</a:t>
+              <a:t>7/24/2017</a:t>
             </a:fld>
             <a:endParaRPr lang="en-US"/>
           </a:p>
@@ -666,7 +666,7 @@
           <a:p>
             <a:fld id="{D54CC0BB-093E-46C4-B018-947CFFB692B4}" type="datetimeFigureOut">
               <a:rPr lang="en-US" smtClean="0"/>
-              <a:t>24-Jul-17</a:t>
+              <a:t>7/24/2017</a:t>
             </a:fld>
             <a:endParaRPr lang="en-US"/>
           </a:p>
@@ -849,7 +849,7 @@
           <a:p>
             <a:fld id="{D54CC0BB-093E-46C4-B018-947CFFB692B4}" type="datetimeFigureOut">
               <a:rPr lang="en-US" smtClean="0"/>
-              <a:t>24-Jul-17</a:t>
+              <a:t>7/24/2017</a:t>
             </a:fld>
             <a:endParaRPr lang="en-US"/>
           </a:p>
@@ -1111,7 +1111,7 @@
           <a:p>
             <a:fld id="{D54CC0BB-093E-46C4-B018-947CFFB692B4}" type="datetimeFigureOut">
               <a:rPr lang="en-US" smtClean="0"/>
-              <a:t>24-Jul-17</a:t>
+              <a:t>7/24/2017</a:t>
             </a:fld>
             <a:endParaRPr lang="en-US"/>
           </a:p>
@@ -1459,7 +1459,7 @@
           <a:p>
             <a:fld id="{D54CC0BB-093E-46C4-B018-947CFFB692B4}" type="datetimeFigureOut">
               <a:rPr lang="en-US" smtClean="0"/>
-              <a:t>24-Jul-17</a:t>
+              <a:t>7/24/2017</a:t>
             </a:fld>
             <a:endParaRPr lang="en-US"/>
           </a:p>
@@ -1767,7 +1767,7 @@
           <a:p>
             <a:fld id="{D54CC0BB-093E-46C4-B018-947CFFB692B4}" type="datetimeFigureOut">
               <a:rPr lang="en-US" smtClean="0"/>
-              <a:t>24-Jul-17</a:t>
+              <a:t>7/24/2017</a:t>
             </a:fld>
             <a:endParaRPr lang="en-US"/>
           </a:p>
@@ -1994,7 +1994,7 @@
           <a:p>
             <a:fld id="{D54CC0BB-093E-46C4-B018-947CFFB692B4}" type="datetimeFigureOut">
               <a:rPr lang="en-US" smtClean="0"/>
-              <a:t>24-Jul-17</a:t>
+              <a:t>7/24/2017</a:t>
             </a:fld>
             <a:endParaRPr lang="en-US"/>
           </a:p>
@@ -2084,7 +2084,7 @@
           <a:p>
             <a:fld id="{D54CC0BB-093E-46C4-B018-947CFFB692B4}" type="datetimeFigureOut">
               <a:rPr lang="en-US" smtClean="0"/>
-              <a:t>24-Jul-17</a:t>
+              <a:t>7/24/2017</a:t>
             </a:fld>
             <a:endParaRPr lang="en-US"/>
           </a:p>
@@ -2372,7 +2372,7 @@
           <a:p>
             <a:fld id="{D54CC0BB-093E-46C4-B018-947CFFB692B4}" type="datetimeFigureOut">
               <a:rPr lang="en-US" smtClean="0"/>
-              <a:t>24-Jul-17</a:t>
+              <a:t>7/24/2017</a:t>
             </a:fld>
             <a:endParaRPr lang="en-US"/>
           </a:p>
@@ -2641,7 +2641,7 @@
           <a:p>
             <a:fld id="{D54CC0BB-093E-46C4-B018-947CFFB692B4}" type="datetimeFigureOut">
               <a:rPr lang="en-US" smtClean="0"/>
-              <a:t>24-Jul-17</a:t>
+              <a:t>7/24/2017</a:t>
             </a:fld>
             <a:endParaRPr lang="en-US"/>
           </a:p>
@@ -2851,7 +2851,7 @@
           <a:p>
             <a:fld id="{D54CC0BB-093E-46C4-B018-947CFFB692B4}" type="datetimeFigureOut">
               <a:rPr lang="en-US" smtClean="0"/>
-              <a:t>24-Jul-17</a:t>
+              <a:t>7/24/2017</a:t>
             </a:fld>
             <a:endParaRPr lang="en-US"/>
           </a:p>
@@ -3393,11 +3393,7 @@
           <a:p>
             <a:r>
               <a:rPr lang="en-US" sz="3600" dirty="0" smtClean="0"/>
-              <a:t>Develop an online system to host Capture the flag contests and </a:t>
-            </a:r>
-            <a:r>
-              <a:rPr lang="en-US" sz="3600" dirty="0" smtClean="0"/>
-              <a:t>Hackathons</a:t>
+              <a:t>Develop an online system to host Capture the flag contests and Hackathons</a:t>
             </a:r>
             <a:endParaRPr lang="en-US" sz="3600" dirty="0"/>
           </a:p>
@@ -3797,11 +3793,7 @@
           <a:p>
             <a:r>
               <a:rPr lang="en-US" dirty="0" smtClean="0"/>
-              <a:t>The user database and challenges’ solution database is secure from data breaches, as </a:t>
-            </a:r>
-            <a:r>
-              <a:rPr lang="en-US" dirty="0" smtClean="0"/>
-              <a:t>those are stored in encrypted form.</a:t>
+              <a:t>The user database and challenges’ solution database is secure from data breaches, as those are stored in encrypted form.</a:t>
             </a:r>
           </a:p>
           <a:p>
@@ -3879,15 +3871,90 @@
             <p:ph idx="1"/>
           </p:nvPr>
         </p:nvSpPr>
-        <p:spPr/>
+        <p:spPr>
+          <a:xfrm>
+            <a:off x="457200" y="2276872"/>
+            <a:ext cx="8229600" cy="3849291"/>
+          </a:xfrm>
+        </p:spPr>
         <p:txBody>
           <a:bodyPr/>
           <a:lstStyle/>
           <a:p>
             <a:r>
               <a:rPr lang="en-US" dirty="0" smtClean="0"/>
-              <a:t>GitHub Repo of the project.</a:t>
-            </a:r>
+              <a:t>GitHub </a:t>
+            </a:r>
+            <a:r>
+              <a:rPr lang="en-US" dirty="0" smtClean="0"/>
+              <a:t>Repository </a:t>
+            </a:r>
+            <a:r>
+              <a:rPr lang="en-US" dirty="0" smtClean="0"/>
+              <a:t>of the </a:t>
+            </a:r>
+            <a:r>
+              <a:rPr lang="en-US" dirty="0" smtClean="0"/>
+              <a:t>project</a:t>
+            </a:r>
+            <a:r>
+              <a:rPr lang="en-US" dirty="0"/>
+              <a:t>: </a:t>
+            </a:r>
+            <a:r>
+              <a:rPr lang="en-US" dirty="0">
+                <a:hlinkClick r:id="rId2"/>
+              </a:rPr>
+              <a:t>https://</a:t>
+            </a:r>
+            <a:r>
+              <a:rPr lang="en-US" dirty="0" smtClean="0">
+                <a:hlinkClick r:id="rId2"/>
+              </a:rPr>
+              <a:t>github.com/SuperLeet-CTF/SuperLeet-CTF</a:t>
+            </a:r>
+            <a:endParaRPr lang="en-US" dirty="0" smtClean="0"/>
+          </a:p>
+          <a:p>
+            <a:endParaRPr lang="en-US" dirty="0"/>
+          </a:p>
+          <a:p>
+            <a:pPr marL="0" indent="0">
+              <a:buNone/>
+            </a:pPr>
+            <a:endParaRPr lang="en-US" dirty="0" smtClean="0"/>
+          </a:p>
+          <a:p>
+            <a:r>
+              <a:rPr lang="en-US" dirty="0" smtClean="0"/>
+              <a:t>GitHub Reports of the </a:t>
+            </a:r>
+            <a:r>
+              <a:rPr lang="en-US" dirty="0"/>
+              <a:t>project: </a:t>
+            </a:r>
+            <a:r>
+              <a:rPr lang="en-US" dirty="0">
+                <a:hlinkClick r:id="rId3"/>
+              </a:rPr>
+              <a:t>https://</a:t>
+            </a:r>
+            <a:r>
+              <a:rPr lang="en-US" dirty="0" smtClean="0">
+                <a:hlinkClick r:id="rId3"/>
+              </a:rPr>
+              <a:t>github.com/SuperLeet-CTF/CTF-project-reports</a:t>
+            </a:r>
+            <a:endParaRPr lang="en-US" dirty="0" smtClean="0"/>
+          </a:p>
+          <a:p>
+            <a:endParaRPr lang="en-US" dirty="0" smtClean="0"/>
+          </a:p>
+          <a:p>
+            <a:pPr marL="0" indent="0">
+              <a:buNone/>
+            </a:pPr>
+            <a:endParaRPr lang="en-US" dirty="0" smtClean="0"/>
           </a:p>
         </p:txBody>
       </p:sp>
@@ -4783,7 +4850,6 @@
               <a:rPr lang="en-US" dirty="0" smtClean="0"/>
               <a:t>The contests would have a start-time and end-time. The participants get to solve the challenges and quizzes within this time-period only.</a:t>
             </a:r>
-            <a:endParaRPr lang="en-US" dirty="0" smtClean="0"/>
           </a:p>
           <a:p>
             <a:endParaRPr lang="en-US" dirty="0"/>
@@ -4874,7 +4940,6 @@
               <a:rPr lang="en-US" dirty="0" smtClean="0"/>
               <a:t>Tags describe the entity in question. For example, the tags of a particular challenge could be – Binary Exploitation, Cryptography. This means this challenge deals with Binary Exploitation and Cryptography.</a:t>
             </a:r>
-            <a:endParaRPr lang="en-US" dirty="0" smtClean="0"/>
           </a:p>
           <a:p>
             <a:r>
@@ -4887,7 +4952,6 @@
               <a:rPr lang="en-US" dirty="0" smtClean="0"/>
               <a:t>Users can filter the challenges or quizzes according to the tags.</a:t>
             </a:r>
-            <a:endParaRPr lang="en-US" dirty="0" smtClean="0"/>
           </a:p>
         </p:txBody>
       </p:sp>

</xml_diff>